<commit_message>
Add the correct Husky system screenshots and info for IP addresses.
</commit_message>
<xml_diff>
--- a/Screenshots/Report/husky_bounding_boxes_design.pptx
+++ b/Screenshots/Report/husky_bounding_boxes_design.pptx
@@ -107,6 +107,11 @@
       </a:defRPr>
     </a:lvl9pPr>
   </p:defaultTextStyle>
+  <p:extLst>
+    <p:ext uri="{EFAFB233-063F-42B5-8137-9DF3F51BA10A}">
+      <p15:sldGuideLst xmlns:p15="http://schemas.microsoft.com/office/powerpoint/2012/main"/>
+    </p:ext>
+  </p:extLst>
 </p:presentation>
 </file>
 
@@ -259,7 +264,7 @@
           <a:p>
             <a:fld id="{006CBCE4-6EC4-4D6B-8520-7A37D295A69C}" type="datetimeFigureOut">
               <a:rPr lang="en-GB" smtClean="0"/>
-              <a:t>26/07/2021</a:t>
+              <a:t>04/08/2021</a:t>
             </a:fld>
             <a:endParaRPr lang="en-GB"/>
           </a:p>
@@ -459,7 +464,7 @@
           <a:p>
             <a:fld id="{006CBCE4-6EC4-4D6B-8520-7A37D295A69C}" type="datetimeFigureOut">
               <a:rPr lang="en-GB" smtClean="0"/>
-              <a:t>26/07/2021</a:t>
+              <a:t>04/08/2021</a:t>
             </a:fld>
             <a:endParaRPr lang="en-GB"/>
           </a:p>
@@ -669,7 +674,7 @@
           <a:p>
             <a:fld id="{006CBCE4-6EC4-4D6B-8520-7A37D295A69C}" type="datetimeFigureOut">
               <a:rPr lang="en-GB" smtClean="0"/>
-              <a:t>26/07/2021</a:t>
+              <a:t>04/08/2021</a:t>
             </a:fld>
             <a:endParaRPr lang="en-GB"/>
           </a:p>
@@ -869,7 +874,7 @@
           <a:p>
             <a:fld id="{006CBCE4-6EC4-4D6B-8520-7A37D295A69C}" type="datetimeFigureOut">
               <a:rPr lang="en-GB" smtClean="0"/>
-              <a:t>26/07/2021</a:t>
+              <a:t>04/08/2021</a:t>
             </a:fld>
             <a:endParaRPr lang="en-GB"/>
           </a:p>
@@ -1145,7 +1150,7 @@
           <a:p>
             <a:fld id="{006CBCE4-6EC4-4D6B-8520-7A37D295A69C}" type="datetimeFigureOut">
               <a:rPr lang="en-GB" smtClean="0"/>
-              <a:t>26/07/2021</a:t>
+              <a:t>04/08/2021</a:t>
             </a:fld>
             <a:endParaRPr lang="en-GB"/>
           </a:p>
@@ -1413,7 +1418,7 @@
           <a:p>
             <a:fld id="{006CBCE4-6EC4-4D6B-8520-7A37D295A69C}" type="datetimeFigureOut">
               <a:rPr lang="en-GB" smtClean="0"/>
-              <a:t>26/07/2021</a:t>
+              <a:t>04/08/2021</a:t>
             </a:fld>
             <a:endParaRPr lang="en-GB"/>
           </a:p>
@@ -1828,7 +1833,7 @@
           <a:p>
             <a:fld id="{006CBCE4-6EC4-4D6B-8520-7A37D295A69C}" type="datetimeFigureOut">
               <a:rPr lang="en-GB" smtClean="0"/>
-              <a:t>26/07/2021</a:t>
+              <a:t>04/08/2021</a:t>
             </a:fld>
             <a:endParaRPr lang="en-GB"/>
           </a:p>
@@ -1970,7 +1975,7 @@
           <a:p>
             <a:fld id="{006CBCE4-6EC4-4D6B-8520-7A37D295A69C}" type="datetimeFigureOut">
               <a:rPr lang="en-GB" smtClean="0"/>
-              <a:t>26/07/2021</a:t>
+              <a:t>04/08/2021</a:t>
             </a:fld>
             <a:endParaRPr lang="en-GB"/>
           </a:p>
@@ -2083,7 +2088,7 @@
           <a:p>
             <a:fld id="{006CBCE4-6EC4-4D6B-8520-7A37D295A69C}" type="datetimeFigureOut">
               <a:rPr lang="en-GB" smtClean="0"/>
-              <a:t>26/07/2021</a:t>
+              <a:t>04/08/2021</a:t>
             </a:fld>
             <a:endParaRPr lang="en-GB"/>
           </a:p>
@@ -2396,7 +2401,7 @@
           <a:p>
             <a:fld id="{006CBCE4-6EC4-4D6B-8520-7A37D295A69C}" type="datetimeFigureOut">
               <a:rPr lang="en-GB" smtClean="0"/>
-              <a:t>26/07/2021</a:t>
+              <a:t>04/08/2021</a:t>
             </a:fld>
             <a:endParaRPr lang="en-GB"/>
           </a:p>
@@ -2685,7 +2690,7 @@
           <a:p>
             <a:fld id="{006CBCE4-6EC4-4D6B-8520-7A37D295A69C}" type="datetimeFigureOut">
               <a:rPr lang="en-GB" smtClean="0"/>
-              <a:t>26/07/2021</a:t>
+              <a:t>04/08/2021</a:t>
             </a:fld>
             <a:endParaRPr lang="en-GB"/>
           </a:p>
@@ -2928,7 +2933,7 @@
           <a:p>
             <a:fld id="{006CBCE4-6EC4-4D6B-8520-7A37D295A69C}" type="datetimeFigureOut">
               <a:rPr lang="en-GB" smtClean="0"/>
-              <a:t>26/07/2021</a:t>
+              <a:t>04/08/2021</a:t>
             </a:fld>
             <a:endParaRPr lang="en-GB"/>
           </a:p>
@@ -3372,8 +3377,8 @@
           </a:stretch>
         </p:blipFill>
         <p:spPr>
-          <a:xfrm rot="16200000">
-            <a:off x="2482881" y="3129227"/>
+          <a:xfrm rot="5400000">
+            <a:off x="2225344" y="3156857"/>
             <a:ext cx="3440427" cy="2448000"/>
           </a:xfrm>
           <a:prstGeom prst="rect">
@@ -3395,7 +3400,7 @@
         </p:nvSpPr>
         <p:spPr>
           <a:xfrm>
-            <a:off x="3090207" y="905071"/>
+            <a:off x="3108852" y="905071"/>
             <a:ext cx="1912775" cy="2057272"/>
           </a:xfrm>
           <a:prstGeom prst="rect">
@@ -3454,7 +3459,7 @@
         </p:nvSpPr>
         <p:spPr>
           <a:xfrm>
-            <a:off x="1241571" y="3102558"/>
+            <a:off x="1269171" y="2962343"/>
             <a:ext cx="1848636" cy="3064977"/>
           </a:xfrm>
           <a:prstGeom prst="rect">
@@ -3513,7 +3518,7 @@
         </p:nvSpPr>
         <p:spPr>
           <a:xfrm>
-            <a:off x="5002981" y="3102558"/>
+            <a:off x="5021627" y="2962343"/>
             <a:ext cx="1848636" cy="3064977"/>
           </a:xfrm>
           <a:prstGeom prst="rect">
@@ -3628,7 +3633,7 @@
         </p:blipFill>
         <p:spPr>
           <a:xfrm>
-            <a:off x="4822981" y="4173227"/>
+            <a:off x="4686889" y="4173227"/>
             <a:ext cx="360000" cy="360000"/>
           </a:xfrm>
           <a:prstGeom prst="rect">
@@ -3706,7 +3711,7 @@
         </p:blipFill>
         <p:spPr>
           <a:xfrm>
-            <a:off x="2937807" y="4173227"/>
+            <a:off x="3117807" y="4173227"/>
             <a:ext cx="360000" cy="360000"/>
           </a:xfrm>
           <a:prstGeom prst="rect">
@@ -4112,8 +4117,8 @@
           </a:stretch>
         </p:blipFill>
         <p:spPr>
-          <a:xfrm rot="16200000">
-            <a:off x="2482881" y="3129227"/>
+          <a:xfrm rot="5400000">
+            <a:off x="2146380" y="3137056"/>
             <a:ext cx="3440427" cy="2448000"/>
           </a:xfrm>
           <a:prstGeom prst="rect">
@@ -4135,7 +4140,7 @@
         </p:nvSpPr>
         <p:spPr>
           <a:xfrm>
-            <a:off x="3090207" y="905071"/>
+            <a:off x="3027807" y="905071"/>
             <a:ext cx="1912775" cy="2057272"/>
           </a:xfrm>
           <a:prstGeom prst="rect">
@@ -4194,7 +4199,7 @@
         </p:nvSpPr>
         <p:spPr>
           <a:xfrm>
-            <a:off x="1412633" y="3102558"/>
+            <a:off x="1347846" y="2962343"/>
             <a:ext cx="1677574" cy="3064977"/>
           </a:xfrm>
           <a:prstGeom prst="rect">
@@ -4253,7 +4258,7 @@
         </p:nvSpPr>
         <p:spPr>
           <a:xfrm>
-            <a:off x="5002981" y="3102558"/>
+            <a:off x="4940582" y="2962343"/>
             <a:ext cx="1677574" cy="3064977"/>
           </a:xfrm>
           <a:prstGeom prst="rect">
@@ -4329,7 +4334,7 @@
         </p:blipFill>
         <p:spPr>
           <a:xfrm>
-            <a:off x="4822981" y="4173227"/>
+            <a:off x="4611071" y="4173227"/>
             <a:ext cx="360000" cy="360000"/>
           </a:xfrm>
           <a:prstGeom prst="rect">
@@ -4368,7 +4373,7 @@
         </p:blipFill>
         <p:spPr>
           <a:xfrm>
-            <a:off x="3866594" y="2782343"/>
+            <a:off x="3804194" y="2782343"/>
             <a:ext cx="360000" cy="360000"/>
           </a:xfrm>
           <a:prstGeom prst="rect">
@@ -4407,7 +4412,7 @@
         </p:blipFill>
         <p:spPr>
           <a:xfrm>
-            <a:off x="2937807" y="4173227"/>
+            <a:off x="3054807" y="4173227"/>
             <a:ext cx="360000" cy="360000"/>
           </a:xfrm>
           <a:prstGeom prst="rect">
@@ -4852,8 +4857,8 @@
           </a:stretch>
         </p:blipFill>
         <p:spPr>
-          <a:xfrm rot="16200000">
-            <a:off x="2089223" y="3119898"/>
+          <a:xfrm rot="5400000">
+            <a:off x="1807167" y="3138187"/>
             <a:ext cx="3440427" cy="2448000"/>
           </a:xfrm>
           <a:prstGeom prst="rect">
@@ -5592,8 +5597,8 @@
           </a:stretch>
         </p:blipFill>
         <p:spPr>
-          <a:xfrm rot="16200000">
-            <a:off x="2089223" y="3119898"/>
+          <a:xfrm rot="5400000">
+            <a:off x="1792197" y="3136300"/>
             <a:ext cx="3440427" cy="2448000"/>
           </a:xfrm>
           <a:prstGeom prst="rect">

</xml_diff>